<commit_message>
update UserGuide and PlayStore
</commit_message>
<xml_diff>
--- a/images/Bilder.pptx
+++ b/images/Bilder.pptx
@@ -6,6 +6,7 @@
   </p:sldMasterIdLst>
   <p:sldIdLst>
     <p:sldId id="256" r:id="rId2"/>
+    <p:sldId id="257" r:id="rId3"/>
   </p:sldIdLst>
   <p:sldSz cx="12192000" cy="6858000"/>
   <p:notesSz cx="6858000" cy="9144000"/>
@@ -104,6 +105,11 @@
       </a:defRPr>
     </a:lvl9pPr>
   </p:defaultTextStyle>
+  <p:extLst>
+    <p:ext uri="{EFAFB233-063F-42B5-8137-9DF3F51BA10A}">
+      <p15:sldGuideLst xmlns:p15="http://schemas.microsoft.com/office/powerpoint/2012/main"/>
+    </p:ext>
+  </p:extLst>
 </p:presentation>
 </file>
 
@@ -254,7 +260,7 @@
           <a:p>
             <a:fld id="{9EB45D4C-A083-4B70-8FE2-06B413A1AB7C}" type="datetimeFigureOut">
               <a:rPr lang="de-DE" smtClean="0"/>
-              <a:t>15.04.2021</a:t>
+              <a:t>22.05.2021</a:t>
             </a:fld>
             <a:endParaRPr lang="de-DE"/>
           </a:p>
@@ -452,7 +458,7 @@
           <a:p>
             <a:fld id="{9EB45D4C-A083-4B70-8FE2-06B413A1AB7C}" type="datetimeFigureOut">
               <a:rPr lang="de-DE" smtClean="0"/>
-              <a:t>15.04.2021</a:t>
+              <a:t>22.05.2021</a:t>
             </a:fld>
             <a:endParaRPr lang="de-DE"/>
           </a:p>
@@ -660,7 +666,7 @@
           <a:p>
             <a:fld id="{9EB45D4C-A083-4B70-8FE2-06B413A1AB7C}" type="datetimeFigureOut">
               <a:rPr lang="de-DE" smtClean="0"/>
-              <a:t>15.04.2021</a:t>
+              <a:t>22.05.2021</a:t>
             </a:fld>
             <a:endParaRPr lang="de-DE"/>
           </a:p>
@@ -858,7 +864,7 @@
           <a:p>
             <a:fld id="{9EB45D4C-A083-4B70-8FE2-06B413A1AB7C}" type="datetimeFigureOut">
               <a:rPr lang="de-DE" smtClean="0"/>
-              <a:t>15.04.2021</a:t>
+              <a:t>22.05.2021</a:t>
             </a:fld>
             <a:endParaRPr lang="de-DE"/>
           </a:p>
@@ -1133,7 +1139,7 @@
           <a:p>
             <a:fld id="{9EB45D4C-A083-4B70-8FE2-06B413A1AB7C}" type="datetimeFigureOut">
               <a:rPr lang="de-DE" smtClean="0"/>
-              <a:t>15.04.2021</a:t>
+              <a:t>22.05.2021</a:t>
             </a:fld>
             <a:endParaRPr lang="de-DE"/>
           </a:p>
@@ -1398,7 +1404,7 @@
           <a:p>
             <a:fld id="{9EB45D4C-A083-4B70-8FE2-06B413A1AB7C}" type="datetimeFigureOut">
               <a:rPr lang="de-DE" smtClean="0"/>
-              <a:t>15.04.2021</a:t>
+              <a:t>22.05.2021</a:t>
             </a:fld>
             <a:endParaRPr lang="de-DE"/>
           </a:p>
@@ -1810,7 +1816,7 @@
           <a:p>
             <a:fld id="{9EB45D4C-A083-4B70-8FE2-06B413A1AB7C}" type="datetimeFigureOut">
               <a:rPr lang="de-DE" smtClean="0"/>
-              <a:t>15.04.2021</a:t>
+              <a:t>22.05.2021</a:t>
             </a:fld>
             <a:endParaRPr lang="de-DE"/>
           </a:p>
@@ -1951,7 +1957,7 @@
           <a:p>
             <a:fld id="{9EB45D4C-A083-4B70-8FE2-06B413A1AB7C}" type="datetimeFigureOut">
               <a:rPr lang="de-DE" smtClean="0"/>
-              <a:t>15.04.2021</a:t>
+              <a:t>22.05.2021</a:t>
             </a:fld>
             <a:endParaRPr lang="de-DE"/>
           </a:p>
@@ -2064,7 +2070,7 @@
           <a:p>
             <a:fld id="{9EB45D4C-A083-4B70-8FE2-06B413A1AB7C}" type="datetimeFigureOut">
               <a:rPr lang="de-DE" smtClean="0"/>
-              <a:t>15.04.2021</a:t>
+              <a:t>22.05.2021</a:t>
             </a:fld>
             <a:endParaRPr lang="de-DE"/>
           </a:p>
@@ -2375,7 +2381,7 @@
           <a:p>
             <a:fld id="{9EB45D4C-A083-4B70-8FE2-06B413A1AB7C}" type="datetimeFigureOut">
               <a:rPr lang="de-DE" smtClean="0"/>
-              <a:t>15.04.2021</a:t>
+              <a:t>22.05.2021</a:t>
             </a:fld>
             <a:endParaRPr lang="de-DE"/>
           </a:p>
@@ -2663,7 +2669,7 @@
           <a:p>
             <a:fld id="{9EB45D4C-A083-4B70-8FE2-06B413A1AB7C}" type="datetimeFigureOut">
               <a:rPr lang="de-DE" smtClean="0"/>
-              <a:t>15.04.2021</a:t>
+              <a:t>22.05.2021</a:t>
             </a:fld>
             <a:endParaRPr lang="de-DE"/>
           </a:p>
@@ -2904,7 +2910,7 @@
           <a:p>
             <a:fld id="{9EB45D4C-A083-4B70-8FE2-06B413A1AB7C}" type="datetimeFigureOut">
               <a:rPr lang="de-DE" smtClean="0"/>
-              <a:t>15.04.2021</a:t>
+              <a:t>22.05.2021</a:t>
             </a:fld>
             <a:endParaRPr lang="de-DE"/>
           </a:p>
@@ -3793,6 +3799,382 @@
 </p:sld>
 </file>
 
+<file path=ppt/slides/slide2.xml><?xml version="1.0" encoding="utf-8"?>
+<p:sld xmlns:a="http://schemas.openxmlformats.org/drawingml/2006/main" xmlns:r="http://schemas.openxmlformats.org/officeDocument/2006/relationships" xmlns:p="http://schemas.openxmlformats.org/presentationml/2006/main">
+  <p:cSld>
+    <p:spTree>
+      <p:nvGrpSpPr>
+        <p:cNvPr id="1" name=""/>
+        <p:cNvGrpSpPr/>
+        <p:nvPr/>
+      </p:nvGrpSpPr>
+      <p:grpSpPr>
+        <a:xfrm>
+          <a:off x="0" y="0"/>
+          <a:ext cx="0" cy="0"/>
+          <a:chOff x="0" y="0"/>
+          <a:chExt cx="0" cy="0"/>
+        </a:xfrm>
+      </p:grpSpPr>
+      <p:pic>
+        <p:nvPicPr>
+          <p:cNvPr id="5" name="Inhaltsplatzhalter 4">
+            <a:extLst>
+              <a:ext uri="{FF2B5EF4-FFF2-40B4-BE49-F238E27FC236}">
+                <a16:creationId xmlns:a16="http://schemas.microsoft.com/office/drawing/2014/main" id="{C4FAF9D5-5AF1-4528-BDE7-1B85B3914118}"/>
+              </a:ext>
+            </a:extLst>
+          </p:cNvPr>
+          <p:cNvPicPr>
+            <a:picLocks noGrp="1" noChangeAspect="1"/>
+          </p:cNvPicPr>
+          <p:nvPr>
+            <p:ph idx="1"/>
+          </p:nvPr>
+        </p:nvPicPr>
+        <p:blipFill>
+          <a:blip r:embed="rId2">
+            <a:extLst>
+              <a:ext uri="{28A0092B-C50C-407E-A947-70E740481C1C}">
+                <a14:useLocalDpi xmlns:a14="http://schemas.microsoft.com/office/drawing/2010/main" val="0"/>
+              </a:ext>
+            </a:extLst>
+          </a:blip>
+          <a:stretch>
+            <a:fillRect/>
+          </a:stretch>
+        </p:blipFill>
+        <p:spPr>
+          <a:xfrm>
+            <a:off x="2134227" y="803496"/>
+            <a:ext cx="2382069" cy="2382069"/>
+          </a:xfrm>
+        </p:spPr>
+      </p:pic>
+      <p:sp>
+        <p:nvSpPr>
+          <p:cNvPr id="6" name="Pfeil: nach rechts 5">
+            <a:extLst>
+              <a:ext uri="{FF2B5EF4-FFF2-40B4-BE49-F238E27FC236}">
+                <a16:creationId xmlns:a16="http://schemas.microsoft.com/office/drawing/2014/main" id="{9618F852-CEA7-4075-B424-4BE55C209053}"/>
+              </a:ext>
+            </a:extLst>
+          </p:cNvPr>
+          <p:cNvSpPr/>
+          <p:nvPr/>
+        </p:nvSpPr>
+        <p:spPr>
+          <a:xfrm rot="5400000">
+            <a:off x="2884830" y="3264816"/>
+            <a:ext cx="880861" cy="483417"/>
+          </a:xfrm>
+          <a:prstGeom prst="rightArrow">
+            <a:avLst>
+              <a:gd name="adj1" fmla="val 50000"/>
+              <a:gd name="adj2" fmla="val 53547"/>
+            </a:avLst>
+          </a:prstGeom>
+          <a:solidFill>
+            <a:schemeClr val="tx1">
+              <a:lumMod val="50000"/>
+              <a:lumOff val="50000"/>
+            </a:schemeClr>
+          </a:solidFill>
+          <a:ln>
+            <a:noFill/>
+          </a:ln>
+        </p:spPr>
+        <p:style>
+          <a:lnRef idx="2">
+            <a:schemeClr val="accent1">
+              <a:shade val="50000"/>
+            </a:schemeClr>
+          </a:lnRef>
+          <a:fillRef idx="1">
+            <a:schemeClr val="accent1"/>
+          </a:fillRef>
+          <a:effectRef idx="0">
+            <a:schemeClr val="accent1"/>
+          </a:effectRef>
+          <a:fontRef idx="minor">
+            <a:schemeClr val="lt1"/>
+          </a:fontRef>
+        </p:style>
+        <p:txBody>
+          <a:bodyPr rtlCol="0" anchor="ctr"/>
+          <a:lstStyle/>
+          <a:p>
+            <a:pPr algn="ctr"/>
+            <a:endParaRPr lang="de-DE"/>
+          </a:p>
+        </p:txBody>
+      </p:sp>
+      <p:pic>
+        <p:nvPicPr>
+          <p:cNvPr id="1026" name="Picture 2">
+            <a:extLst>
+              <a:ext uri="{FF2B5EF4-FFF2-40B4-BE49-F238E27FC236}">
+                <a16:creationId xmlns:a16="http://schemas.microsoft.com/office/drawing/2014/main" id="{ABE932C5-C14F-49C9-9BF8-BD439308C92F}"/>
+              </a:ext>
+            </a:extLst>
+          </p:cNvPr>
+          <p:cNvPicPr>
+            <a:picLocks noChangeAspect="1" noChangeArrowheads="1"/>
+          </p:cNvPicPr>
+          <p:nvPr/>
+        </p:nvPicPr>
+        <p:blipFill>
+          <a:blip r:embed="rId3">
+            <a:extLst>
+              <a:ext uri="{28A0092B-C50C-407E-A947-70E740481C1C}">
+                <a14:useLocalDpi xmlns:a14="http://schemas.microsoft.com/office/drawing/2010/main" val="0"/>
+              </a:ext>
+            </a:extLst>
+          </a:blip>
+          <a:srcRect/>
+          <a:stretch>
+            <a:fillRect/>
+          </a:stretch>
+        </p:blipFill>
+        <p:spPr bwMode="auto">
+          <a:xfrm>
+            <a:off x="2220363" y="3910009"/>
+            <a:ext cx="2209800" cy="2209800"/>
+          </a:xfrm>
+          <a:prstGeom prst="rect">
+            <a:avLst/>
+          </a:prstGeom>
+          <a:noFill/>
+          <a:extLst>
+            <a:ext uri="{909E8E84-426E-40DD-AFC4-6F175D3DCCD1}">
+              <a14:hiddenFill xmlns:a14="http://schemas.microsoft.com/office/drawing/2010/main">
+                <a:solidFill>
+                  <a:srgbClr val="FFFFFF"/>
+                </a:solidFill>
+              </a14:hiddenFill>
+            </a:ext>
+          </a:extLst>
+        </p:spPr>
+      </p:pic>
+      <p:pic>
+        <p:nvPicPr>
+          <p:cNvPr id="1028" name="Picture 4" descr="Instagram Logo: Richtlinien, Vorschriften und Download. So ist die Nutzung  möglich. - allfacebook.de">
+            <a:extLst>
+              <a:ext uri="{FF2B5EF4-FFF2-40B4-BE49-F238E27FC236}">
+                <a16:creationId xmlns:a16="http://schemas.microsoft.com/office/drawing/2014/main" id="{5E6DD8F9-6F1F-466E-9CFA-6C6035DF1277}"/>
+              </a:ext>
+            </a:extLst>
+          </p:cNvPr>
+          <p:cNvPicPr>
+            <a:picLocks noChangeAspect="1" noChangeArrowheads="1"/>
+          </p:cNvPicPr>
+          <p:nvPr/>
+        </p:nvPicPr>
+        <p:blipFill>
+          <a:blip r:embed="rId4">
+            <a:extLst>
+              <a:ext uri="{28A0092B-C50C-407E-A947-70E740481C1C}">
+                <a14:useLocalDpi xmlns:a14="http://schemas.microsoft.com/office/drawing/2010/main" val="0"/>
+              </a:ext>
+            </a:extLst>
+          </a:blip>
+          <a:srcRect/>
+          <a:stretch>
+            <a:fillRect/>
+          </a:stretch>
+        </p:blipFill>
+        <p:spPr bwMode="auto">
+          <a:xfrm>
+            <a:off x="7090230" y="922969"/>
+            <a:ext cx="2143125" cy="2143125"/>
+          </a:xfrm>
+          <a:prstGeom prst="rect">
+            <a:avLst/>
+          </a:prstGeom>
+          <a:noFill/>
+          <a:extLst>
+            <a:ext uri="{909E8E84-426E-40DD-AFC4-6F175D3DCCD1}">
+              <a14:hiddenFill xmlns:a14="http://schemas.microsoft.com/office/drawing/2010/main">
+                <a:solidFill>
+                  <a:srgbClr val="FFFFFF"/>
+                </a:solidFill>
+              </a14:hiddenFill>
+            </a:ext>
+          </a:extLst>
+        </p:spPr>
+      </p:pic>
+      <p:sp>
+        <p:nvSpPr>
+          <p:cNvPr id="7" name="Gleich 6">
+            <a:extLst>
+              <a:ext uri="{FF2B5EF4-FFF2-40B4-BE49-F238E27FC236}">
+                <a16:creationId xmlns:a16="http://schemas.microsoft.com/office/drawing/2014/main" id="{E01702E3-5D46-4D94-B1C7-B047CCCFB0CF}"/>
+              </a:ext>
+            </a:extLst>
+          </p:cNvPr>
+          <p:cNvSpPr/>
+          <p:nvPr/>
+        </p:nvSpPr>
+        <p:spPr>
+          <a:xfrm>
+            <a:off x="4765023" y="1476578"/>
+            <a:ext cx="1651842" cy="1035904"/>
+          </a:xfrm>
+          <a:prstGeom prst="mathEqual">
+            <a:avLst/>
+          </a:prstGeom>
+          <a:solidFill>
+            <a:schemeClr val="tx1"/>
+          </a:solidFill>
+          <a:ln>
+            <a:noFill/>
+          </a:ln>
+        </p:spPr>
+        <p:style>
+          <a:lnRef idx="2">
+            <a:schemeClr val="accent1">
+              <a:shade val="50000"/>
+            </a:schemeClr>
+          </a:lnRef>
+          <a:fillRef idx="1">
+            <a:schemeClr val="accent1"/>
+          </a:fillRef>
+          <a:effectRef idx="0">
+            <a:schemeClr val="accent1"/>
+          </a:effectRef>
+          <a:fontRef idx="minor">
+            <a:schemeClr val="lt1"/>
+          </a:fontRef>
+        </p:style>
+        <p:txBody>
+          <a:bodyPr rtlCol="0" anchor="ctr"/>
+          <a:lstStyle/>
+          <a:p>
+            <a:pPr algn="ctr"/>
+            <a:endParaRPr lang="de-DE">
+              <a:solidFill>
+                <a:schemeClr val="tx1"/>
+              </a:solidFill>
+            </a:endParaRPr>
+          </a:p>
+        </p:txBody>
+      </p:sp>
+      <p:pic>
+        <p:nvPicPr>
+          <p:cNvPr id="10" name="Picture 4" descr="Instagram Logo: Richtlinien, Vorschriften und Download. So ist die Nutzung  möglich. - allfacebook.de">
+            <a:extLst>
+              <a:ext uri="{FF2B5EF4-FFF2-40B4-BE49-F238E27FC236}">
+                <a16:creationId xmlns:a16="http://schemas.microsoft.com/office/drawing/2014/main" id="{1236D305-1B23-4288-BBAE-0213149C68FA}"/>
+              </a:ext>
+            </a:extLst>
+          </p:cNvPr>
+          <p:cNvPicPr>
+            <a:picLocks noChangeAspect="1" noChangeArrowheads="1"/>
+          </p:cNvPicPr>
+          <p:nvPr/>
+        </p:nvPicPr>
+        <p:blipFill>
+          <a:blip r:embed="rId4">
+            <a:extLst>
+              <a:ext uri="{28A0092B-C50C-407E-A947-70E740481C1C}">
+                <a14:useLocalDpi xmlns:a14="http://schemas.microsoft.com/office/drawing/2010/main" val="0"/>
+              </a:ext>
+            </a:extLst>
+          </a:blip>
+          <a:srcRect/>
+          <a:stretch>
+            <a:fillRect/>
+          </a:stretch>
+        </p:blipFill>
+        <p:spPr bwMode="auto">
+          <a:xfrm>
+            <a:off x="7090229" y="3910009"/>
+            <a:ext cx="2143125" cy="2143125"/>
+          </a:xfrm>
+          <a:prstGeom prst="rect">
+            <a:avLst/>
+          </a:prstGeom>
+          <a:noFill/>
+          <a:extLst>
+            <a:ext uri="{909E8E84-426E-40DD-AFC4-6F175D3DCCD1}">
+              <a14:hiddenFill xmlns:a14="http://schemas.microsoft.com/office/drawing/2010/main">
+                <a:solidFill>
+                  <a:srgbClr val="FFFFFF"/>
+                </a:solidFill>
+              </a14:hiddenFill>
+            </a:ext>
+          </a:extLst>
+        </p:spPr>
+      </p:pic>
+      <p:sp>
+        <p:nvSpPr>
+          <p:cNvPr id="8" name="Ungleich 7">
+            <a:extLst>
+              <a:ext uri="{FF2B5EF4-FFF2-40B4-BE49-F238E27FC236}">
+                <a16:creationId xmlns:a16="http://schemas.microsoft.com/office/drawing/2014/main" id="{6FD6ED02-4EF0-41C3-82EE-9FB109614855}"/>
+              </a:ext>
+            </a:extLst>
+          </p:cNvPr>
+          <p:cNvSpPr/>
+          <p:nvPr/>
+        </p:nvSpPr>
+        <p:spPr>
+          <a:xfrm>
+            <a:off x="4765023" y="4463619"/>
+            <a:ext cx="1651842" cy="1035904"/>
+          </a:xfrm>
+          <a:prstGeom prst="mathNotEqual">
+            <a:avLst/>
+          </a:prstGeom>
+          <a:solidFill>
+            <a:schemeClr val="tx1"/>
+          </a:solidFill>
+          <a:ln>
+            <a:noFill/>
+          </a:ln>
+        </p:spPr>
+        <p:style>
+          <a:lnRef idx="2">
+            <a:schemeClr val="accent1">
+              <a:shade val="50000"/>
+            </a:schemeClr>
+          </a:lnRef>
+          <a:fillRef idx="1">
+            <a:schemeClr val="accent1"/>
+          </a:fillRef>
+          <a:effectRef idx="0">
+            <a:schemeClr val="accent1"/>
+          </a:effectRef>
+          <a:fontRef idx="minor">
+            <a:schemeClr val="lt1"/>
+          </a:fontRef>
+        </p:style>
+        <p:txBody>
+          <a:bodyPr rtlCol="0" anchor="ctr"/>
+          <a:lstStyle/>
+          <a:p>
+            <a:pPr algn="ctr"/>
+            <a:endParaRPr lang="de-DE">
+              <a:solidFill>
+                <a:schemeClr val="tx1"/>
+              </a:solidFill>
+            </a:endParaRPr>
+          </a:p>
+        </p:txBody>
+      </p:sp>
+    </p:spTree>
+    <p:extLst>
+      <p:ext uri="{BB962C8B-B14F-4D97-AF65-F5344CB8AC3E}">
+        <p14:creationId xmlns:p14="http://schemas.microsoft.com/office/powerpoint/2010/main" val="3009584031"/>
+      </p:ext>
+    </p:extLst>
+  </p:cSld>
+  <p:clrMapOvr>
+    <a:masterClrMapping/>
+  </p:clrMapOvr>
+</p:sld>
+</file>
+
 <file path=ppt/theme/theme1.xml><?xml version="1.0" encoding="utf-8"?>
 <a:theme xmlns:a="http://schemas.openxmlformats.org/drawingml/2006/main" name="Office">
   <a:themeElements>

</xml_diff>